<commit_message>
updated site and ppt
</commit_message>
<xml_diff>
--- a/FinalPresentation.pptx
+++ b/FinalPresentation.pptx
@@ -2,7 +2,7 @@
 <file path=ppt/presentation.xml><?xml version="1.0" encoding="utf-8"?>
 <p:presentation xmlns:a="http://schemas.openxmlformats.org/drawingml/2006/main" xmlns:r="http://schemas.openxmlformats.org/officeDocument/2006/relationships" xmlns:p="http://schemas.openxmlformats.org/presentationml/2006/main" saveSubsetFonts="1" autoCompressPictures="0">
   <p:sldMasterIdLst>
-    <p:sldMasterId id="2147483648" r:id="rId1"/>
+    <p:sldMasterId id="2147483672" r:id="rId1"/>
   </p:sldMasterIdLst>
   <p:sldIdLst>
     <p:sldId id="256" r:id="rId2"/>
@@ -13,7 +13,7 @@
     <a:defPPr>
       <a:defRPr lang="en-US"/>
     </a:defPPr>
-    <a:lvl1pPr marL="0" algn="l" defTabSz="914400" rtl="0" eaLnBrk="1" latinLnBrk="0" hangingPunct="1">
+    <a:lvl1pPr marL="0" algn="l" defTabSz="457200" rtl="0" eaLnBrk="1" latinLnBrk="0" hangingPunct="1">
       <a:defRPr sz="1800" kern="1200">
         <a:solidFill>
           <a:schemeClr val="tx1"/>
@@ -23,7 +23,7 @@
         <a:cs typeface="+mn-cs"/>
       </a:defRPr>
     </a:lvl1pPr>
-    <a:lvl2pPr marL="457200" algn="l" defTabSz="914400" rtl="0" eaLnBrk="1" latinLnBrk="0" hangingPunct="1">
+    <a:lvl2pPr marL="457200" algn="l" defTabSz="457200" rtl="0" eaLnBrk="1" latinLnBrk="0" hangingPunct="1">
       <a:defRPr sz="1800" kern="1200">
         <a:solidFill>
           <a:schemeClr val="tx1"/>
@@ -33,7 +33,7 @@
         <a:cs typeface="+mn-cs"/>
       </a:defRPr>
     </a:lvl2pPr>
-    <a:lvl3pPr marL="914400" algn="l" defTabSz="914400" rtl="0" eaLnBrk="1" latinLnBrk="0" hangingPunct="1">
+    <a:lvl3pPr marL="914400" algn="l" defTabSz="457200" rtl="0" eaLnBrk="1" latinLnBrk="0" hangingPunct="1">
       <a:defRPr sz="1800" kern="1200">
         <a:solidFill>
           <a:schemeClr val="tx1"/>
@@ -43,7 +43,7 @@
         <a:cs typeface="+mn-cs"/>
       </a:defRPr>
     </a:lvl3pPr>
-    <a:lvl4pPr marL="1371600" algn="l" defTabSz="914400" rtl="0" eaLnBrk="1" latinLnBrk="0" hangingPunct="1">
+    <a:lvl4pPr marL="1371600" algn="l" defTabSz="457200" rtl="0" eaLnBrk="1" latinLnBrk="0" hangingPunct="1">
       <a:defRPr sz="1800" kern="1200">
         <a:solidFill>
           <a:schemeClr val="tx1"/>
@@ -53,7 +53,7 @@
         <a:cs typeface="+mn-cs"/>
       </a:defRPr>
     </a:lvl4pPr>
-    <a:lvl5pPr marL="1828800" algn="l" defTabSz="914400" rtl="0" eaLnBrk="1" latinLnBrk="0" hangingPunct="1">
+    <a:lvl5pPr marL="1828800" algn="l" defTabSz="457200" rtl="0" eaLnBrk="1" latinLnBrk="0" hangingPunct="1">
       <a:defRPr sz="1800" kern="1200">
         <a:solidFill>
           <a:schemeClr val="tx1"/>
@@ -63,7 +63,7 @@
         <a:cs typeface="+mn-cs"/>
       </a:defRPr>
     </a:lvl5pPr>
-    <a:lvl6pPr marL="2286000" algn="l" defTabSz="914400" rtl="0" eaLnBrk="1" latinLnBrk="0" hangingPunct="1">
+    <a:lvl6pPr marL="2286000" algn="l" defTabSz="457200" rtl="0" eaLnBrk="1" latinLnBrk="0" hangingPunct="1">
       <a:defRPr sz="1800" kern="1200">
         <a:solidFill>
           <a:schemeClr val="tx1"/>
@@ -73,7 +73,7 @@
         <a:cs typeface="+mn-cs"/>
       </a:defRPr>
     </a:lvl6pPr>
-    <a:lvl7pPr marL="2743200" algn="l" defTabSz="914400" rtl="0" eaLnBrk="1" latinLnBrk="0" hangingPunct="1">
+    <a:lvl7pPr marL="2743200" algn="l" defTabSz="457200" rtl="0" eaLnBrk="1" latinLnBrk="0" hangingPunct="1">
       <a:defRPr sz="1800" kern="1200">
         <a:solidFill>
           <a:schemeClr val="tx1"/>
@@ -83,7 +83,7 @@
         <a:cs typeface="+mn-cs"/>
       </a:defRPr>
     </a:lvl7pPr>
-    <a:lvl8pPr marL="3200400" algn="l" defTabSz="914400" rtl="0" eaLnBrk="1" latinLnBrk="0" hangingPunct="1">
+    <a:lvl8pPr marL="3200400" algn="l" defTabSz="457200" rtl="0" eaLnBrk="1" latinLnBrk="0" hangingPunct="1">
       <a:defRPr sz="1800" kern="1200">
         <a:solidFill>
           <a:schemeClr val="tx1"/>
@@ -93,7 +93,7 @@
         <a:cs typeface="+mn-cs"/>
       </a:defRPr>
     </a:lvl8pPr>
-    <a:lvl9pPr marL="3657600" algn="l" defTabSz="914400" rtl="0" eaLnBrk="1" latinLnBrk="0" hangingPunct="1">
+    <a:lvl9pPr marL="3657600" algn="l" defTabSz="457200" rtl="0" eaLnBrk="1" latinLnBrk="0" hangingPunct="1">
       <a:defRPr sz="1800" kern="1200">
         <a:solidFill>
           <a:schemeClr val="tx1"/>
@@ -104,6 +104,11 @@
       </a:defRPr>
     </a:lvl9pPr>
   </p:defaultTextStyle>
+  <p:extLst>
+    <p:ext uri="{EFAFB233-063F-42B5-8137-9DF3F51BA10A}">
+      <p15:sldGuideLst xmlns:p15="http://schemas.microsoft.com/office/powerpoint/2012/main"/>
+    </p:ext>
+  </p:extLst>
 </p:presentation>
 </file>
 
@@ -126,13 +131,7 @@
       </p:grpSpPr>
       <p:sp>
         <p:nvSpPr>
-          <p:cNvPr id="2" name="Title 1">
-            <a:extLst>
-              <a:ext uri="{FF2B5EF4-FFF2-40B4-BE49-F238E27FC236}">
-                <a16:creationId xmlns:a16="http://schemas.microsoft.com/office/drawing/2014/main" id="{27DE285A-3030-E54B-897A-C21E685A6945}"/>
-              </a:ext>
-            </a:extLst>
-          </p:cNvPr>
+          <p:cNvPr id="2" name="Title 1"/>
           <p:cNvSpPr>
             <a:spLocks noGrp="1"/>
           </p:cNvSpPr>
@@ -158,18 +157,13 @@
               <a:rPr lang="en-US"/>
               <a:t>Click to edit Master title style</a:t>
             </a:r>
-          </a:p>
-        </p:txBody>
-      </p:sp>
-      <p:sp>
-        <p:nvSpPr>
-          <p:cNvPr id="3" name="Subtitle 2">
-            <a:extLst>
-              <a:ext uri="{FF2B5EF4-FFF2-40B4-BE49-F238E27FC236}">
-                <a16:creationId xmlns:a16="http://schemas.microsoft.com/office/drawing/2014/main" id="{30B98A01-0A31-7944-AD53-73934290309A}"/>
-              </a:ext>
-            </a:extLst>
-          </p:cNvPr>
+            <a:endParaRPr lang="en-US" dirty="0"/>
+          </a:p>
+        </p:txBody>
+      </p:sp>
+      <p:sp>
+        <p:nvSpPr>
+          <p:cNvPr id="3" name="Subtitle 2"/>
           <p:cNvSpPr>
             <a:spLocks noGrp="1"/>
           </p:cNvSpPr>
@@ -228,18 +222,13 @@
               <a:rPr lang="en-US"/>
               <a:t>Click to edit Master subtitle style</a:t>
             </a:r>
-          </a:p>
-        </p:txBody>
-      </p:sp>
-      <p:sp>
-        <p:nvSpPr>
-          <p:cNvPr id="4" name="Date Placeholder 3">
-            <a:extLst>
-              <a:ext uri="{FF2B5EF4-FFF2-40B4-BE49-F238E27FC236}">
-                <a16:creationId xmlns:a16="http://schemas.microsoft.com/office/drawing/2014/main" id="{7E822B0A-C537-DE4C-B244-70E046378F13}"/>
-              </a:ext>
-            </a:extLst>
-          </p:cNvPr>
+            <a:endParaRPr lang="en-US" dirty="0"/>
+          </a:p>
+        </p:txBody>
+      </p:sp>
+      <p:sp>
+        <p:nvSpPr>
+          <p:cNvPr id="4" name="Date Placeholder 3"/>
           <p:cNvSpPr>
             <a:spLocks noGrp="1"/>
           </p:cNvSpPr>
@@ -254,7 +243,7 @@
           <a:p>
             <a:fld id="{56238ED0-F578-2D4C-AD64-804B2004F0AF}" type="datetimeFigureOut">
               <a:rPr lang="en-US" smtClean="0"/>
-              <a:t>4/19/19</a:t>
+              <a:t>4/21/19</a:t>
             </a:fld>
             <a:endParaRPr lang="en-US"/>
           </a:p>
@@ -262,13 +251,7 @@
       </p:sp>
       <p:sp>
         <p:nvSpPr>
-          <p:cNvPr id="5" name="Footer Placeholder 4">
-            <a:extLst>
-              <a:ext uri="{FF2B5EF4-FFF2-40B4-BE49-F238E27FC236}">
-                <a16:creationId xmlns:a16="http://schemas.microsoft.com/office/drawing/2014/main" id="{9088CDEA-8742-6E47-B97C-E2C799FB3CEC}"/>
-              </a:ext>
-            </a:extLst>
-          </p:cNvPr>
+          <p:cNvPr id="5" name="Footer Placeholder 4"/>
           <p:cNvSpPr>
             <a:spLocks noGrp="1"/>
           </p:cNvSpPr>
@@ -287,13 +270,7 @@
       </p:sp>
       <p:sp>
         <p:nvSpPr>
-          <p:cNvPr id="6" name="Slide Number Placeholder 5">
-            <a:extLst>
-              <a:ext uri="{FF2B5EF4-FFF2-40B4-BE49-F238E27FC236}">
-                <a16:creationId xmlns:a16="http://schemas.microsoft.com/office/drawing/2014/main" id="{7C56BD3A-A560-F84E-BC93-F594EE2E1D65}"/>
-              </a:ext>
-            </a:extLst>
-          </p:cNvPr>
+          <p:cNvPr id="6" name="Slide Number Placeholder 5"/>
           <p:cNvSpPr>
             <a:spLocks noGrp="1"/>
           </p:cNvSpPr>
@@ -317,7 +294,7 @@
     </p:spTree>
     <p:extLst>
       <p:ext uri="{BB962C8B-B14F-4D97-AF65-F5344CB8AC3E}">
-        <p14:creationId xmlns:p14="http://schemas.microsoft.com/office/powerpoint/2010/main" val="2131963642"/>
+        <p14:creationId xmlns:p14="http://schemas.microsoft.com/office/powerpoint/2010/main" val="4160357340"/>
       </p:ext>
     </p:extLst>
   </p:cSld>
@@ -346,13 +323,7 @@
       </p:grpSpPr>
       <p:sp>
         <p:nvSpPr>
-          <p:cNvPr id="2" name="Title 1">
-            <a:extLst>
-              <a:ext uri="{FF2B5EF4-FFF2-40B4-BE49-F238E27FC236}">
-                <a16:creationId xmlns:a16="http://schemas.microsoft.com/office/drawing/2014/main" id="{7F1049B9-2217-804F-B8A6-235056FA4F4B}"/>
-              </a:ext>
-            </a:extLst>
-          </p:cNvPr>
+          <p:cNvPr id="2" name="Title 1"/>
           <p:cNvSpPr>
             <a:spLocks noGrp="1"/>
           </p:cNvSpPr>
@@ -369,18 +340,13 @@
               <a:rPr lang="en-US"/>
               <a:t>Click to edit Master title style</a:t>
             </a:r>
-          </a:p>
-        </p:txBody>
-      </p:sp>
-      <p:sp>
-        <p:nvSpPr>
-          <p:cNvPr id="3" name="Vertical Text Placeholder 2">
-            <a:extLst>
-              <a:ext uri="{FF2B5EF4-FFF2-40B4-BE49-F238E27FC236}">
-                <a16:creationId xmlns:a16="http://schemas.microsoft.com/office/drawing/2014/main" id="{DA4459CF-A6C0-CF47-A03B-6710914301E7}"/>
-              </a:ext>
-            </a:extLst>
-          </p:cNvPr>
+            <a:endParaRPr lang="en-US" dirty="0"/>
+          </a:p>
+        </p:txBody>
+      </p:sp>
+      <p:sp>
+        <p:nvSpPr>
+          <p:cNvPr id="3" name="Vertical Text Placeholder 2"/>
           <p:cNvSpPr>
             <a:spLocks noGrp="1"/>
           </p:cNvSpPr>
@@ -426,18 +392,13 @@
               <a:rPr lang="en-US"/>
               <a:t>Fifth level</a:t>
             </a:r>
-          </a:p>
-        </p:txBody>
-      </p:sp>
-      <p:sp>
-        <p:nvSpPr>
-          <p:cNvPr id="4" name="Date Placeholder 3">
-            <a:extLst>
-              <a:ext uri="{FF2B5EF4-FFF2-40B4-BE49-F238E27FC236}">
-                <a16:creationId xmlns:a16="http://schemas.microsoft.com/office/drawing/2014/main" id="{B32C5665-A790-5442-9E83-B7A61407A1F1}"/>
-              </a:ext>
-            </a:extLst>
-          </p:cNvPr>
+            <a:endParaRPr lang="en-US" dirty="0"/>
+          </a:p>
+        </p:txBody>
+      </p:sp>
+      <p:sp>
+        <p:nvSpPr>
+          <p:cNvPr id="4" name="Date Placeholder 3"/>
           <p:cNvSpPr>
             <a:spLocks noGrp="1"/>
           </p:cNvSpPr>
@@ -452,7 +413,7 @@
           <a:p>
             <a:fld id="{56238ED0-F578-2D4C-AD64-804B2004F0AF}" type="datetimeFigureOut">
               <a:rPr lang="en-US" smtClean="0"/>
-              <a:t>4/19/19</a:t>
+              <a:t>4/21/19</a:t>
             </a:fld>
             <a:endParaRPr lang="en-US"/>
           </a:p>
@@ -460,13 +421,7 @@
       </p:sp>
       <p:sp>
         <p:nvSpPr>
-          <p:cNvPr id="5" name="Footer Placeholder 4">
-            <a:extLst>
-              <a:ext uri="{FF2B5EF4-FFF2-40B4-BE49-F238E27FC236}">
-                <a16:creationId xmlns:a16="http://schemas.microsoft.com/office/drawing/2014/main" id="{A076F604-7A33-AF42-97B3-8C7266B3BC9B}"/>
-              </a:ext>
-            </a:extLst>
-          </p:cNvPr>
+          <p:cNvPr id="5" name="Footer Placeholder 4"/>
           <p:cNvSpPr>
             <a:spLocks noGrp="1"/>
           </p:cNvSpPr>
@@ -485,13 +440,7 @@
       </p:sp>
       <p:sp>
         <p:nvSpPr>
-          <p:cNvPr id="6" name="Slide Number Placeholder 5">
-            <a:extLst>
-              <a:ext uri="{FF2B5EF4-FFF2-40B4-BE49-F238E27FC236}">
-                <a16:creationId xmlns:a16="http://schemas.microsoft.com/office/drawing/2014/main" id="{FA4D306A-DD18-7A41-B828-1A7698716444}"/>
-              </a:ext>
-            </a:extLst>
-          </p:cNvPr>
+          <p:cNvPr id="6" name="Slide Number Placeholder 5"/>
           <p:cNvSpPr>
             <a:spLocks noGrp="1"/>
           </p:cNvSpPr>
@@ -515,7 +464,7 @@
     </p:spTree>
     <p:extLst>
       <p:ext uri="{BB962C8B-B14F-4D97-AF65-F5344CB8AC3E}">
-        <p14:creationId xmlns:p14="http://schemas.microsoft.com/office/powerpoint/2010/main" val="2112415199"/>
+        <p14:creationId xmlns:p14="http://schemas.microsoft.com/office/powerpoint/2010/main" val="3809839439"/>
       </p:ext>
     </p:extLst>
   </p:cSld>
@@ -544,13 +493,7 @@
       </p:grpSpPr>
       <p:sp>
         <p:nvSpPr>
-          <p:cNvPr id="2" name="Vertical Title 1">
-            <a:extLst>
-              <a:ext uri="{FF2B5EF4-FFF2-40B4-BE49-F238E27FC236}">
-                <a16:creationId xmlns:a16="http://schemas.microsoft.com/office/drawing/2014/main" id="{35EE3021-AD05-EB45-94D9-E460B3F32822}"/>
-              </a:ext>
-            </a:extLst>
-          </p:cNvPr>
+          <p:cNvPr id="2" name="Vertical Title 1"/>
           <p:cNvSpPr>
             <a:spLocks noGrp="1"/>
           </p:cNvSpPr>
@@ -572,18 +515,13 @@
               <a:rPr lang="en-US"/>
               <a:t>Click to edit Master title style</a:t>
             </a:r>
-          </a:p>
-        </p:txBody>
-      </p:sp>
-      <p:sp>
-        <p:nvSpPr>
-          <p:cNvPr id="3" name="Vertical Text Placeholder 2">
-            <a:extLst>
-              <a:ext uri="{FF2B5EF4-FFF2-40B4-BE49-F238E27FC236}">
-                <a16:creationId xmlns:a16="http://schemas.microsoft.com/office/drawing/2014/main" id="{1E2AA3A5-0EA4-5043-BE73-C7A3C9256D6F}"/>
-              </a:ext>
-            </a:extLst>
-          </p:cNvPr>
+            <a:endParaRPr lang="en-US" dirty="0"/>
+          </a:p>
+        </p:txBody>
+      </p:sp>
+      <p:sp>
+        <p:nvSpPr>
+          <p:cNvPr id="3" name="Vertical Text Placeholder 2"/>
           <p:cNvSpPr>
             <a:spLocks noGrp="1"/>
           </p:cNvSpPr>
@@ -634,18 +572,13 @@
               <a:rPr lang="en-US"/>
               <a:t>Fifth level</a:t>
             </a:r>
-          </a:p>
-        </p:txBody>
-      </p:sp>
-      <p:sp>
-        <p:nvSpPr>
-          <p:cNvPr id="4" name="Date Placeholder 3">
-            <a:extLst>
-              <a:ext uri="{FF2B5EF4-FFF2-40B4-BE49-F238E27FC236}">
-                <a16:creationId xmlns:a16="http://schemas.microsoft.com/office/drawing/2014/main" id="{8A7F11D4-5FAC-6B45-970E-7D8332F18A20}"/>
-              </a:ext>
-            </a:extLst>
-          </p:cNvPr>
+            <a:endParaRPr lang="en-US" dirty="0"/>
+          </a:p>
+        </p:txBody>
+      </p:sp>
+      <p:sp>
+        <p:nvSpPr>
+          <p:cNvPr id="4" name="Date Placeholder 3"/>
           <p:cNvSpPr>
             <a:spLocks noGrp="1"/>
           </p:cNvSpPr>
@@ -660,7 +593,7 @@
           <a:p>
             <a:fld id="{56238ED0-F578-2D4C-AD64-804B2004F0AF}" type="datetimeFigureOut">
               <a:rPr lang="en-US" smtClean="0"/>
-              <a:t>4/19/19</a:t>
+              <a:t>4/21/19</a:t>
             </a:fld>
             <a:endParaRPr lang="en-US"/>
           </a:p>
@@ -668,13 +601,7 @@
       </p:sp>
       <p:sp>
         <p:nvSpPr>
-          <p:cNvPr id="5" name="Footer Placeholder 4">
-            <a:extLst>
-              <a:ext uri="{FF2B5EF4-FFF2-40B4-BE49-F238E27FC236}">
-                <a16:creationId xmlns:a16="http://schemas.microsoft.com/office/drawing/2014/main" id="{04D59BF1-C911-9F40-921C-D9901FDF347C}"/>
-              </a:ext>
-            </a:extLst>
-          </p:cNvPr>
+          <p:cNvPr id="5" name="Footer Placeholder 4"/>
           <p:cNvSpPr>
             <a:spLocks noGrp="1"/>
           </p:cNvSpPr>
@@ -693,13 +620,7 @@
       </p:sp>
       <p:sp>
         <p:nvSpPr>
-          <p:cNvPr id="6" name="Slide Number Placeholder 5">
-            <a:extLst>
-              <a:ext uri="{FF2B5EF4-FFF2-40B4-BE49-F238E27FC236}">
-                <a16:creationId xmlns:a16="http://schemas.microsoft.com/office/drawing/2014/main" id="{F1475D50-3015-CC48-8E64-D8215A38F174}"/>
-              </a:ext>
-            </a:extLst>
-          </p:cNvPr>
+          <p:cNvPr id="6" name="Slide Number Placeholder 5"/>
           <p:cNvSpPr>
             <a:spLocks noGrp="1"/>
           </p:cNvSpPr>
@@ -723,7 +644,7 @@
     </p:spTree>
     <p:extLst>
       <p:ext uri="{BB962C8B-B14F-4D97-AF65-F5344CB8AC3E}">
-        <p14:creationId xmlns:p14="http://schemas.microsoft.com/office/powerpoint/2010/main" val="4206606562"/>
+        <p14:creationId xmlns:p14="http://schemas.microsoft.com/office/powerpoint/2010/main" val="1701286038"/>
       </p:ext>
     </p:extLst>
   </p:cSld>
@@ -752,13 +673,7 @@
       </p:grpSpPr>
       <p:sp>
         <p:nvSpPr>
-          <p:cNvPr id="2" name="Title 1">
-            <a:extLst>
-              <a:ext uri="{FF2B5EF4-FFF2-40B4-BE49-F238E27FC236}">
-                <a16:creationId xmlns:a16="http://schemas.microsoft.com/office/drawing/2014/main" id="{D01875DF-5E19-9C44-B1DE-E597DAA49F5A}"/>
-              </a:ext>
-            </a:extLst>
-          </p:cNvPr>
+          <p:cNvPr id="2" name="Title 1"/>
           <p:cNvSpPr>
             <a:spLocks noGrp="1"/>
           </p:cNvSpPr>
@@ -775,18 +690,13 @@
               <a:rPr lang="en-US"/>
               <a:t>Click to edit Master title style</a:t>
             </a:r>
-          </a:p>
-        </p:txBody>
-      </p:sp>
-      <p:sp>
-        <p:nvSpPr>
-          <p:cNvPr id="3" name="Content Placeholder 2">
-            <a:extLst>
-              <a:ext uri="{FF2B5EF4-FFF2-40B4-BE49-F238E27FC236}">
-                <a16:creationId xmlns:a16="http://schemas.microsoft.com/office/drawing/2014/main" id="{52F0535C-6DD8-8143-AC9C-27EFB4955C59}"/>
-              </a:ext>
-            </a:extLst>
-          </p:cNvPr>
+            <a:endParaRPr lang="en-US" dirty="0"/>
+          </a:p>
+        </p:txBody>
+      </p:sp>
+      <p:sp>
+        <p:nvSpPr>
+          <p:cNvPr id="3" name="Content Placeholder 2"/>
           <p:cNvSpPr>
             <a:spLocks noGrp="1"/>
           </p:cNvSpPr>
@@ -832,18 +742,13 @@
               <a:rPr lang="en-US"/>
               <a:t>Fifth level</a:t>
             </a:r>
-          </a:p>
-        </p:txBody>
-      </p:sp>
-      <p:sp>
-        <p:nvSpPr>
-          <p:cNvPr id="4" name="Date Placeholder 3">
-            <a:extLst>
-              <a:ext uri="{FF2B5EF4-FFF2-40B4-BE49-F238E27FC236}">
-                <a16:creationId xmlns:a16="http://schemas.microsoft.com/office/drawing/2014/main" id="{43CED2F1-0817-BA45-9B54-53957A4726E4}"/>
-              </a:ext>
-            </a:extLst>
-          </p:cNvPr>
+            <a:endParaRPr lang="en-US" dirty="0"/>
+          </a:p>
+        </p:txBody>
+      </p:sp>
+      <p:sp>
+        <p:nvSpPr>
+          <p:cNvPr id="4" name="Date Placeholder 3"/>
           <p:cNvSpPr>
             <a:spLocks noGrp="1"/>
           </p:cNvSpPr>
@@ -858,7 +763,7 @@
           <a:p>
             <a:fld id="{56238ED0-F578-2D4C-AD64-804B2004F0AF}" type="datetimeFigureOut">
               <a:rPr lang="en-US" smtClean="0"/>
-              <a:t>4/19/19</a:t>
+              <a:t>4/21/19</a:t>
             </a:fld>
             <a:endParaRPr lang="en-US"/>
           </a:p>
@@ -866,13 +771,7 @@
       </p:sp>
       <p:sp>
         <p:nvSpPr>
-          <p:cNvPr id="5" name="Footer Placeholder 4">
-            <a:extLst>
-              <a:ext uri="{FF2B5EF4-FFF2-40B4-BE49-F238E27FC236}">
-                <a16:creationId xmlns:a16="http://schemas.microsoft.com/office/drawing/2014/main" id="{DB70273B-F0A1-8C42-8A7B-1C1E41BBDCA1}"/>
-              </a:ext>
-            </a:extLst>
-          </p:cNvPr>
+          <p:cNvPr id="5" name="Footer Placeholder 4"/>
           <p:cNvSpPr>
             <a:spLocks noGrp="1"/>
           </p:cNvSpPr>
@@ -891,13 +790,7 @@
       </p:sp>
       <p:sp>
         <p:nvSpPr>
-          <p:cNvPr id="6" name="Slide Number Placeholder 5">
-            <a:extLst>
-              <a:ext uri="{FF2B5EF4-FFF2-40B4-BE49-F238E27FC236}">
-                <a16:creationId xmlns:a16="http://schemas.microsoft.com/office/drawing/2014/main" id="{F58C8D75-EB8A-6E4E-B5BA-532B0DF3C2FF}"/>
-              </a:ext>
-            </a:extLst>
-          </p:cNvPr>
+          <p:cNvPr id="6" name="Slide Number Placeholder 5"/>
           <p:cNvSpPr>
             <a:spLocks noGrp="1"/>
           </p:cNvSpPr>
@@ -921,7 +814,7 @@
     </p:spTree>
     <p:extLst>
       <p:ext uri="{BB962C8B-B14F-4D97-AF65-F5344CB8AC3E}">
-        <p14:creationId xmlns:p14="http://schemas.microsoft.com/office/powerpoint/2010/main" val="1893742206"/>
+        <p14:creationId xmlns:p14="http://schemas.microsoft.com/office/powerpoint/2010/main" val="1564271287"/>
       </p:ext>
     </p:extLst>
   </p:cSld>
@@ -950,13 +843,7 @@
       </p:grpSpPr>
       <p:sp>
         <p:nvSpPr>
-          <p:cNvPr id="2" name="Title 1">
-            <a:extLst>
-              <a:ext uri="{FF2B5EF4-FFF2-40B4-BE49-F238E27FC236}">
-                <a16:creationId xmlns:a16="http://schemas.microsoft.com/office/drawing/2014/main" id="{90C1C8E2-B982-8346-96A9-CB567C99030B}"/>
-              </a:ext>
-            </a:extLst>
-          </p:cNvPr>
+          <p:cNvPr id="2" name="Title 1"/>
           <p:cNvSpPr>
             <a:spLocks noGrp="1"/>
           </p:cNvSpPr>
@@ -982,18 +869,13 @@
               <a:rPr lang="en-US"/>
               <a:t>Click to edit Master title style</a:t>
             </a:r>
-          </a:p>
-        </p:txBody>
-      </p:sp>
-      <p:sp>
-        <p:nvSpPr>
-          <p:cNvPr id="3" name="Text Placeholder 2">
-            <a:extLst>
-              <a:ext uri="{FF2B5EF4-FFF2-40B4-BE49-F238E27FC236}">
-                <a16:creationId xmlns:a16="http://schemas.microsoft.com/office/drawing/2014/main" id="{48363467-F12C-F745-87B2-17A499FDF311}"/>
-              </a:ext>
-            </a:extLst>
-          </p:cNvPr>
+            <a:endParaRPr lang="en-US" dirty="0"/>
+          </a:p>
+        </p:txBody>
+      </p:sp>
+      <p:sp>
+        <p:nvSpPr>
+          <p:cNvPr id="3" name="Text Placeholder 2"/>
           <p:cNvSpPr>
             <a:spLocks noGrp="1"/>
           </p:cNvSpPr>
@@ -1112,13 +994,7 @@
       </p:sp>
       <p:sp>
         <p:nvSpPr>
-          <p:cNvPr id="4" name="Date Placeholder 3">
-            <a:extLst>
-              <a:ext uri="{FF2B5EF4-FFF2-40B4-BE49-F238E27FC236}">
-                <a16:creationId xmlns:a16="http://schemas.microsoft.com/office/drawing/2014/main" id="{EB5BF7BB-BCC4-6E4C-8239-9D3CF6C8CA18}"/>
-              </a:ext>
-            </a:extLst>
-          </p:cNvPr>
+          <p:cNvPr id="4" name="Date Placeholder 3"/>
           <p:cNvSpPr>
             <a:spLocks noGrp="1"/>
           </p:cNvSpPr>
@@ -1133,7 +1009,7 @@
           <a:p>
             <a:fld id="{56238ED0-F578-2D4C-AD64-804B2004F0AF}" type="datetimeFigureOut">
               <a:rPr lang="en-US" smtClean="0"/>
-              <a:t>4/19/19</a:t>
+              <a:t>4/21/19</a:t>
             </a:fld>
             <a:endParaRPr lang="en-US"/>
           </a:p>
@@ -1141,13 +1017,7 @@
       </p:sp>
       <p:sp>
         <p:nvSpPr>
-          <p:cNvPr id="5" name="Footer Placeholder 4">
-            <a:extLst>
-              <a:ext uri="{FF2B5EF4-FFF2-40B4-BE49-F238E27FC236}">
-                <a16:creationId xmlns:a16="http://schemas.microsoft.com/office/drawing/2014/main" id="{CE5DE2FE-EB3E-184E-8FF3-4930DA0DEFB8}"/>
-              </a:ext>
-            </a:extLst>
-          </p:cNvPr>
+          <p:cNvPr id="5" name="Footer Placeholder 4"/>
           <p:cNvSpPr>
             <a:spLocks noGrp="1"/>
           </p:cNvSpPr>
@@ -1166,13 +1036,7 @@
       </p:sp>
       <p:sp>
         <p:nvSpPr>
-          <p:cNvPr id="6" name="Slide Number Placeholder 5">
-            <a:extLst>
-              <a:ext uri="{FF2B5EF4-FFF2-40B4-BE49-F238E27FC236}">
-                <a16:creationId xmlns:a16="http://schemas.microsoft.com/office/drawing/2014/main" id="{ECAB8534-7028-1144-B58B-A370E43392F5}"/>
-              </a:ext>
-            </a:extLst>
-          </p:cNvPr>
+          <p:cNvPr id="6" name="Slide Number Placeholder 5"/>
           <p:cNvSpPr>
             <a:spLocks noGrp="1"/>
           </p:cNvSpPr>
@@ -1196,7 +1060,7 @@
     </p:spTree>
     <p:extLst>
       <p:ext uri="{BB962C8B-B14F-4D97-AF65-F5344CB8AC3E}">
-        <p14:creationId xmlns:p14="http://schemas.microsoft.com/office/powerpoint/2010/main" val="1303076600"/>
+        <p14:creationId xmlns:p14="http://schemas.microsoft.com/office/powerpoint/2010/main" val="2841027473"/>
       </p:ext>
     </p:extLst>
   </p:cSld>
@@ -1225,13 +1089,7 @@
       </p:grpSpPr>
       <p:sp>
         <p:nvSpPr>
-          <p:cNvPr id="2" name="Title 1">
-            <a:extLst>
-              <a:ext uri="{FF2B5EF4-FFF2-40B4-BE49-F238E27FC236}">
-                <a16:creationId xmlns:a16="http://schemas.microsoft.com/office/drawing/2014/main" id="{0F16BAE4-FC7B-6742-959A-32264C72D197}"/>
-              </a:ext>
-            </a:extLst>
-          </p:cNvPr>
+          <p:cNvPr id="2" name="Title 1"/>
           <p:cNvSpPr>
             <a:spLocks noGrp="1"/>
           </p:cNvSpPr>
@@ -1248,18 +1106,13 @@
               <a:rPr lang="en-US"/>
               <a:t>Click to edit Master title style</a:t>
             </a:r>
-          </a:p>
-        </p:txBody>
-      </p:sp>
-      <p:sp>
-        <p:nvSpPr>
-          <p:cNvPr id="3" name="Content Placeholder 2">
-            <a:extLst>
-              <a:ext uri="{FF2B5EF4-FFF2-40B4-BE49-F238E27FC236}">
-                <a16:creationId xmlns:a16="http://schemas.microsoft.com/office/drawing/2014/main" id="{B28BAAAF-8A45-EF45-8B80-5E1ADB999867}"/>
-              </a:ext>
-            </a:extLst>
-          </p:cNvPr>
+            <a:endParaRPr lang="en-US" dirty="0"/>
+          </a:p>
+        </p:txBody>
+      </p:sp>
+      <p:sp>
+        <p:nvSpPr>
+          <p:cNvPr id="3" name="Content Placeholder 2"/>
           <p:cNvSpPr>
             <a:spLocks noGrp="1"/>
           </p:cNvSpPr>
@@ -1310,18 +1163,13 @@
               <a:rPr lang="en-US"/>
               <a:t>Fifth level</a:t>
             </a:r>
-          </a:p>
-        </p:txBody>
-      </p:sp>
-      <p:sp>
-        <p:nvSpPr>
-          <p:cNvPr id="4" name="Content Placeholder 3">
-            <a:extLst>
-              <a:ext uri="{FF2B5EF4-FFF2-40B4-BE49-F238E27FC236}">
-                <a16:creationId xmlns:a16="http://schemas.microsoft.com/office/drawing/2014/main" id="{5E3B8743-9970-0E41-B936-472EE840268E}"/>
-              </a:ext>
-            </a:extLst>
-          </p:cNvPr>
+            <a:endParaRPr lang="en-US" dirty="0"/>
+          </a:p>
+        </p:txBody>
+      </p:sp>
+      <p:sp>
+        <p:nvSpPr>
+          <p:cNvPr id="4" name="Content Placeholder 3"/>
           <p:cNvSpPr>
             <a:spLocks noGrp="1"/>
           </p:cNvSpPr>
@@ -1372,18 +1220,13 @@
               <a:rPr lang="en-US"/>
               <a:t>Fifth level</a:t>
             </a:r>
-          </a:p>
-        </p:txBody>
-      </p:sp>
-      <p:sp>
-        <p:nvSpPr>
-          <p:cNvPr id="5" name="Date Placeholder 4">
-            <a:extLst>
-              <a:ext uri="{FF2B5EF4-FFF2-40B4-BE49-F238E27FC236}">
-                <a16:creationId xmlns:a16="http://schemas.microsoft.com/office/drawing/2014/main" id="{3E99974B-AFA4-D244-9BBB-7025D4BB91D6}"/>
-              </a:ext>
-            </a:extLst>
-          </p:cNvPr>
+            <a:endParaRPr lang="en-US" dirty="0"/>
+          </a:p>
+        </p:txBody>
+      </p:sp>
+      <p:sp>
+        <p:nvSpPr>
+          <p:cNvPr id="5" name="Date Placeholder 4"/>
           <p:cNvSpPr>
             <a:spLocks noGrp="1"/>
           </p:cNvSpPr>
@@ -1398,7 +1241,7 @@
           <a:p>
             <a:fld id="{56238ED0-F578-2D4C-AD64-804B2004F0AF}" type="datetimeFigureOut">
               <a:rPr lang="en-US" smtClean="0"/>
-              <a:t>4/19/19</a:t>
+              <a:t>4/21/19</a:t>
             </a:fld>
             <a:endParaRPr lang="en-US"/>
           </a:p>
@@ -1406,13 +1249,7 @@
       </p:sp>
       <p:sp>
         <p:nvSpPr>
-          <p:cNvPr id="6" name="Footer Placeholder 5">
-            <a:extLst>
-              <a:ext uri="{FF2B5EF4-FFF2-40B4-BE49-F238E27FC236}">
-                <a16:creationId xmlns:a16="http://schemas.microsoft.com/office/drawing/2014/main" id="{FEA02519-4965-2D44-87EB-3AE4A769C6A8}"/>
-              </a:ext>
-            </a:extLst>
-          </p:cNvPr>
+          <p:cNvPr id="6" name="Footer Placeholder 5"/>
           <p:cNvSpPr>
             <a:spLocks noGrp="1"/>
           </p:cNvSpPr>
@@ -1431,13 +1268,7 @@
       </p:sp>
       <p:sp>
         <p:nvSpPr>
-          <p:cNvPr id="7" name="Slide Number Placeholder 6">
-            <a:extLst>
-              <a:ext uri="{FF2B5EF4-FFF2-40B4-BE49-F238E27FC236}">
-                <a16:creationId xmlns:a16="http://schemas.microsoft.com/office/drawing/2014/main" id="{D2D82E8C-4603-CD40-A781-851B117F49EF}"/>
-              </a:ext>
-            </a:extLst>
-          </p:cNvPr>
+          <p:cNvPr id="7" name="Slide Number Placeholder 6"/>
           <p:cNvSpPr>
             <a:spLocks noGrp="1"/>
           </p:cNvSpPr>
@@ -1461,7 +1292,7 @@
     </p:spTree>
     <p:extLst>
       <p:ext uri="{BB962C8B-B14F-4D97-AF65-F5344CB8AC3E}">
-        <p14:creationId xmlns:p14="http://schemas.microsoft.com/office/powerpoint/2010/main" val="839922244"/>
+        <p14:creationId xmlns:p14="http://schemas.microsoft.com/office/powerpoint/2010/main" val="514348175"/>
       </p:ext>
     </p:extLst>
   </p:cSld>
@@ -1490,13 +1321,7 @@
       </p:grpSpPr>
       <p:sp>
         <p:nvSpPr>
-          <p:cNvPr id="2" name="Title 1">
-            <a:extLst>
-              <a:ext uri="{FF2B5EF4-FFF2-40B4-BE49-F238E27FC236}">
-                <a16:creationId xmlns:a16="http://schemas.microsoft.com/office/drawing/2014/main" id="{2A88044A-3B2E-2A45-868C-915FA72AAAB5}"/>
-              </a:ext>
-            </a:extLst>
-          </p:cNvPr>
+          <p:cNvPr id="2" name="Title 1"/>
           <p:cNvSpPr>
             <a:spLocks noGrp="1"/>
           </p:cNvSpPr>
@@ -1518,18 +1343,13 @@
               <a:rPr lang="en-US"/>
               <a:t>Click to edit Master title style</a:t>
             </a:r>
-          </a:p>
-        </p:txBody>
-      </p:sp>
-      <p:sp>
-        <p:nvSpPr>
-          <p:cNvPr id="3" name="Text Placeholder 2">
-            <a:extLst>
-              <a:ext uri="{FF2B5EF4-FFF2-40B4-BE49-F238E27FC236}">
-                <a16:creationId xmlns:a16="http://schemas.microsoft.com/office/drawing/2014/main" id="{3E82AB07-1B96-5445-9438-94E3275AAE82}"/>
-              </a:ext>
-            </a:extLst>
-          </p:cNvPr>
+            <a:endParaRPr lang="en-US" dirty="0"/>
+          </a:p>
+        </p:txBody>
+      </p:sp>
+      <p:sp>
+        <p:nvSpPr>
+          <p:cNvPr id="3" name="Text Placeholder 2"/>
           <p:cNvSpPr>
             <a:spLocks noGrp="1"/>
           </p:cNvSpPr>
@@ -1594,13 +1414,7 @@
       </p:sp>
       <p:sp>
         <p:nvSpPr>
-          <p:cNvPr id="4" name="Content Placeholder 3">
-            <a:extLst>
-              <a:ext uri="{FF2B5EF4-FFF2-40B4-BE49-F238E27FC236}">
-                <a16:creationId xmlns:a16="http://schemas.microsoft.com/office/drawing/2014/main" id="{A9A53E0E-66FF-8549-96F7-1CEA550A9A94}"/>
-              </a:ext>
-            </a:extLst>
-          </p:cNvPr>
+          <p:cNvPr id="4" name="Content Placeholder 3"/>
           <p:cNvSpPr>
             <a:spLocks noGrp="1"/>
           </p:cNvSpPr>
@@ -1651,18 +1465,13 @@
               <a:rPr lang="en-US"/>
               <a:t>Fifth level</a:t>
             </a:r>
-          </a:p>
-        </p:txBody>
-      </p:sp>
-      <p:sp>
-        <p:nvSpPr>
-          <p:cNvPr id="5" name="Text Placeholder 4">
-            <a:extLst>
-              <a:ext uri="{FF2B5EF4-FFF2-40B4-BE49-F238E27FC236}">
-                <a16:creationId xmlns:a16="http://schemas.microsoft.com/office/drawing/2014/main" id="{8534FBCB-7CBA-9E43-9850-945B007855AC}"/>
-              </a:ext>
-            </a:extLst>
-          </p:cNvPr>
+            <a:endParaRPr lang="en-US" dirty="0"/>
+          </a:p>
+        </p:txBody>
+      </p:sp>
+      <p:sp>
+        <p:nvSpPr>
+          <p:cNvPr id="5" name="Text Placeholder 4"/>
           <p:cNvSpPr>
             <a:spLocks noGrp="1"/>
           </p:cNvSpPr>
@@ -1727,13 +1536,7 @@
       </p:sp>
       <p:sp>
         <p:nvSpPr>
-          <p:cNvPr id="6" name="Content Placeholder 5">
-            <a:extLst>
-              <a:ext uri="{FF2B5EF4-FFF2-40B4-BE49-F238E27FC236}">
-                <a16:creationId xmlns:a16="http://schemas.microsoft.com/office/drawing/2014/main" id="{8759FD6F-D893-E341-A5D6-47F173E4190A}"/>
-              </a:ext>
-            </a:extLst>
-          </p:cNvPr>
+          <p:cNvPr id="6" name="Content Placeholder 5"/>
           <p:cNvSpPr>
             <a:spLocks noGrp="1"/>
           </p:cNvSpPr>
@@ -1784,18 +1587,13 @@
               <a:rPr lang="en-US"/>
               <a:t>Fifth level</a:t>
             </a:r>
-          </a:p>
-        </p:txBody>
-      </p:sp>
-      <p:sp>
-        <p:nvSpPr>
-          <p:cNvPr id="7" name="Date Placeholder 6">
-            <a:extLst>
-              <a:ext uri="{FF2B5EF4-FFF2-40B4-BE49-F238E27FC236}">
-                <a16:creationId xmlns:a16="http://schemas.microsoft.com/office/drawing/2014/main" id="{CF8C66B7-21A8-BB42-8719-F82D22D0D933}"/>
-              </a:ext>
-            </a:extLst>
-          </p:cNvPr>
+            <a:endParaRPr lang="en-US" dirty="0"/>
+          </a:p>
+        </p:txBody>
+      </p:sp>
+      <p:sp>
+        <p:nvSpPr>
+          <p:cNvPr id="7" name="Date Placeholder 6"/>
           <p:cNvSpPr>
             <a:spLocks noGrp="1"/>
           </p:cNvSpPr>
@@ -1810,7 +1608,7 @@
           <a:p>
             <a:fld id="{56238ED0-F578-2D4C-AD64-804B2004F0AF}" type="datetimeFigureOut">
               <a:rPr lang="en-US" smtClean="0"/>
-              <a:t>4/19/19</a:t>
+              <a:t>4/21/19</a:t>
             </a:fld>
             <a:endParaRPr lang="en-US"/>
           </a:p>
@@ -1818,13 +1616,7 @@
       </p:sp>
       <p:sp>
         <p:nvSpPr>
-          <p:cNvPr id="8" name="Footer Placeholder 7">
-            <a:extLst>
-              <a:ext uri="{FF2B5EF4-FFF2-40B4-BE49-F238E27FC236}">
-                <a16:creationId xmlns:a16="http://schemas.microsoft.com/office/drawing/2014/main" id="{810B7964-6628-6F45-B168-3F17B0C9603B}"/>
-              </a:ext>
-            </a:extLst>
-          </p:cNvPr>
+          <p:cNvPr id="8" name="Footer Placeholder 7"/>
           <p:cNvSpPr>
             <a:spLocks noGrp="1"/>
           </p:cNvSpPr>
@@ -1843,13 +1635,7 @@
       </p:sp>
       <p:sp>
         <p:nvSpPr>
-          <p:cNvPr id="9" name="Slide Number Placeholder 8">
-            <a:extLst>
-              <a:ext uri="{FF2B5EF4-FFF2-40B4-BE49-F238E27FC236}">
-                <a16:creationId xmlns:a16="http://schemas.microsoft.com/office/drawing/2014/main" id="{DD384872-BF2D-6E44-BB2E-18753E9ECBEA}"/>
-              </a:ext>
-            </a:extLst>
-          </p:cNvPr>
+          <p:cNvPr id="9" name="Slide Number Placeholder 8"/>
           <p:cNvSpPr>
             <a:spLocks noGrp="1"/>
           </p:cNvSpPr>
@@ -1873,7 +1659,7 @@
     </p:spTree>
     <p:extLst>
       <p:ext uri="{BB962C8B-B14F-4D97-AF65-F5344CB8AC3E}">
-        <p14:creationId xmlns:p14="http://schemas.microsoft.com/office/powerpoint/2010/main" val="3690241087"/>
+        <p14:creationId xmlns:p14="http://schemas.microsoft.com/office/powerpoint/2010/main" val="3691479980"/>
       </p:ext>
     </p:extLst>
   </p:cSld>
@@ -1902,13 +1688,7 @@
       </p:grpSpPr>
       <p:sp>
         <p:nvSpPr>
-          <p:cNvPr id="2" name="Title 1">
-            <a:extLst>
-              <a:ext uri="{FF2B5EF4-FFF2-40B4-BE49-F238E27FC236}">
-                <a16:creationId xmlns:a16="http://schemas.microsoft.com/office/drawing/2014/main" id="{A859C5EF-CBDE-784F-A57F-87FC766EBD7E}"/>
-              </a:ext>
-            </a:extLst>
-          </p:cNvPr>
+          <p:cNvPr id="2" name="Title 1"/>
           <p:cNvSpPr>
             <a:spLocks noGrp="1"/>
           </p:cNvSpPr>
@@ -1925,18 +1705,13 @@
               <a:rPr lang="en-US"/>
               <a:t>Click to edit Master title style</a:t>
             </a:r>
-          </a:p>
-        </p:txBody>
-      </p:sp>
-      <p:sp>
-        <p:nvSpPr>
-          <p:cNvPr id="3" name="Date Placeholder 2">
-            <a:extLst>
-              <a:ext uri="{FF2B5EF4-FFF2-40B4-BE49-F238E27FC236}">
-                <a16:creationId xmlns:a16="http://schemas.microsoft.com/office/drawing/2014/main" id="{8F3EC32D-FEA3-E645-9CE9-53E4B32A8B56}"/>
-              </a:ext>
-            </a:extLst>
-          </p:cNvPr>
+            <a:endParaRPr lang="en-US" dirty="0"/>
+          </a:p>
+        </p:txBody>
+      </p:sp>
+      <p:sp>
+        <p:nvSpPr>
+          <p:cNvPr id="3" name="Date Placeholder 2"/>
           <p:cNvSpPr>
             <a:spLocks noGrp="1"/>
           </p:cNvSpPr>
@@ -1951,7 +1726,7 @@
           <a:p>
             <a:fld id="{56238ED0-F578-2D4C-AD64-804B2004F0AF}" type="datetimeFigureOut">
               <a:rPr lang="en-US" smtClean="0"/>
-              <a:t>4/19/19</a:t>
+              <a:t>4/21/19</a:t>
             </a:fld>
             <a:endParaRPr lang="en-US"/>
           </a:p>
@@ -1959,13 +1734,7 @@
       </p:sp>
       <p:sp>
         <p:nvSpPr>
-          <p:cNvPr id="4" name="Footer Placeholder 3">
-            <a:extLst>
-              <a:ext uri="{FF2B5EF4-FFF2-40B4-BE49-F238E27FC236}">
-                <a16:creationId xmlns:a16="http://schemas.microsoft.com/office/drawing/2014/main" id="{3B765DE3-CB99-5B4D-9FDA-9CD11EB9541F}"/>
-              </a:ext>
-            </a:extLst>
-          </p:cNvPr>
+          <p:cNvPr id="4" name="Footer Placeholder 3"/>
           <p:cNvSpPr>
             <a:spLocks noGrp="1"/>
           </p:cNvSpPr>
@@ -1984,13 +1753,7 @@
       </p:sp>
       <p:sp>
         <p:nvSpPr>
-          <p:cNvPr id="5" name="Slide Number Placeholder 4">
-            <a:extLst>
-              <a:ext uri="{FF2B5EF4-FFF2-40B4-BE49-F238E27FC236}">
-                <a16:creationId xmlns:a16="http://schemas.microsoft.com/office/drawing/2014/main" id="{598F24FE-DAF1-6341-9463-D3C9AE39C8D9}"/>
-              </a:ext>
-            </a:extLst>
-          </p:cNvPr>
+          <p:cNvPr id="5" name="Slide Number Placeholder 4"/>
           <p:cNvSpPr>
             <a:spLocks noGrp="1"/>
           </p:cNvSpPr>
@@ -2014,7 +1777,7 @@
     </p:spTree>
     <p:extLst>
       <p:ext uri="{BB962C8B-B14F-4D97-AF65-F5344CB8AC3E}">
-        <p14:creationId xmlns:p14="http://schemas.microsoft.com/office/powerpoint/2010/main" val="3712775902"/>
+        <p14:creationId xmlns:p14="http://schemas.microsoft.com/office/powerpoint/2010/main" val="2604378168"/>
       </p:ext>
     </p:extLst>
   </p:cSld>
@@ -2043,13 +1806,7 @@
       </p:grpSpPr>
       <p:sp>
         <p:nvSpPr>
-          <p:cNvPr id="2" name="Date Placeholder 1">
-            <a:extLst>
-              <a:ext uri="{FF2B5EF4-FFF2-40B4-BE49-F238E27FC236}">
-                <a16:creationId xmlns:a16="http://schemas.microsoft.com/office/drawing/2014/main" id="{DE5BBA9F-0D6B-3F4A-B381-8708195F1DB1}"/>
-              </a:ext>
-            </a:extLst>
-          </p:cNvPr>
+          <p:cNvPr id="2" name="Date Placeholder 1"/>
           <p:cNvSpPr>
             <a:spLocks noGrp="1"/>
           </p:cNvSpPr>
@@ -2064,7 +1821,7 @@
           <a:p>
             <a:fld id="{56238ED0-F578-2D4C-AD64-804B2004F0AF}" type="datetimeFigureOut">
               <a:rPr lang="en-US" smtClean="0"/>
-              <a:t>4/19/19</a:t>
+              <a:t>4/21/19</a:t>
             </a:fld>
             <a:endParaRPr lang="en-US"/>
           </a:p>
@@ -2072,13 +1829,7 @@
       </p:sp>
       <p:sp>
         <p:nvSpPr>
-          <p:cNvPr id="3" name="Footer Placeholder 2">
-            <a:extLst>
-              <a:ext uri="{FF2B5EF4-FFF2-40B4-BE49-F238E27FC236}">
-                <a16:creationId xmlns:a16="http://schemas.microsoft.com/office/drawing/2014/main" id="{6609BDED-12E3-9443-8863-40E354BAAA73}"/>
-              </a:ext>
-            </a:extLst>
-          </p:cNvPr>
+          <p:cNvPr id="3" name="Footer Placeholder 2"/>
           <p:cNvSpPr>
             <a:spLocks noGrp="1"/>
           </p:cNvSpPr>
@@ -2097,13 +1848,7 @@
       </p:sp>
       <p:sp>
         <p:nvSpPr>
-          <p:cNvPr id="4" name="Slide Number Placeholder 3">
-            <a:extLst>
-              <a:ext uri="{FF2B5EF4-FFF2-40B4-BE49-F238E27FC236}">
-                <a16:creationId xmlns:a16="http://schemas.microsoft.com/office/drawing/2014/main" id="{C6058D69-BCFA-B044-B596-DE0F82C9F884}"/>
-              </a:ext>
-            </a:extLst>
-          </p:cNvPr>
+          <p:cNvPr id="4" name="Slide Number Placeholder 3"/>
           <p:cNvSpPr>
             <a:spLocks noGrp="1"/>
           </p:cNvSpPr>
@@ -2127,7 +1872,7 @@
     </p:spTree>
     <p:extLst>
       <p:ext uri="{BB962C8B-B14F-4D97-AF65-F5344CB8AC3E}">
-        <p14:creationId xmlns:p14="http://schemas.microsoft.com/office/powerpoint/2010/main" val="2680065039"/>
+        <p14:creationId xmlns:p14="http://schemas.microsoft.com/office/powerpoint/2010/main" val="3221354819"/>
       </p:ext>
     </p:extLst>
   </p:cSld>
@@ -2156,13 +1901,7 @@
       </p:grpSpPr>
       <p:sp>
         <p:nvSpPr>
-          <p:cNvPr id="2" name="Title 1">
-            <a:extLst>
-              <a:ext uri="{FF2B5EF4-FFF2-40B4-BE49-F238E27FC236}">
-                <a16:creationId xmlns:a16="http://schemas.microsoft.com/office/drawing/2014/main" id="{96C003DF-752D-2B43-ACF8-6B29A1C5ED44}"/>
-              </a:ext>
-            </a:extLst>
-          </p:cNvPr>
+          <p:cNvPr id="2" name="Title 1"/>
           <p:cNvSpPr>
             <a:spLocks noGrp="1"/>
           </p:cNvSpPr>
@@ -2188,18 +1927,13 @@
               <a:rPr lang="en-US"/>
               <a:t>Click to edit Master title style</a:t>
             </a:r>
-          </a:p>
-        </p:txBody>
-      </p:sp>
-      <p:sp>
-        <p:nvSpPr>
-          <p:cNvPr id="3" name="Content Placeholder 2">
-            <a:extLst>
-              <a:ext uri="{FF2B5EF4-FFF2-40B4-BE49-F238E27FC236}">
-                <a16:creationId xmlns:a16="http://schemas.microsoft.com/office/drawing/2014/main" id="{12860970-8570-1740-B293-C2F0BC1C8CBD}"/>
-              </a:ext>
-            </a:extLst>
-          </p:cNvPr>
+            <a:endParaRPr lang="en-US" dirty="0"/>
+          </a:p>
+        </p:txBody>
+      </p:sp>
+      <p:sp>
+        <p:nvSpPr>
+          <p:cNvPr id="3" name="Content Placeholder 2"/>
           <p:cNvSpPr>
             <a:spLocks noGrp="1"/>
           </p:cNvSpPr>
@@ -2278,18 +2012,13 @@
               <a:rPr lang="en-US"/>
               <a:t>Fifth level</a:t>
             </a:r>
-          </a:p>
-        </p:txBody>
-      </p:sp>
-      <p:sp>
-        <p:nvSpPr>
-          <p:cNvPr id="4" name="Text Placeholder 3">
-            <a:extLst>
-              <a:ext uri="{FF2B5EF4-FFF2-40B4-BE49-F238E27FC236}">
-                <a16:creationId xmlns:a16="http://schemas.microsoft.com/office/drawing/2014/main" id="{22DF0C96-B04A-B94C-B122-77B4114CF0C5}"/>
-              </a:ext>
-            </a:extLst>
-          </p:cNvPr>
+            <a:endParaRPr lang="en-US" dirty="0"/>
+          </a:p>
+        </p:txBody>
+      </p:sp>
+      <p:sp>
+        <p:nvSpPr>
+          <p:cNvPr id="4" name="Text Placeholder 3"/>
           <p:cNvSpPr>
             <a:spLocks noGrp="1"/>
           </p:cNvSpPr>
@@ -2354,13 +2083,7 @@
       </p:sp>
       <p:sp>
         <p:nvSpPr>
-          <p:cNvPr id="5" name="Date Placeholder 4">
-            <a:extLst>
-              <a:ext uri="{FF2B5EF4-FFF2-40B4-BE49-F238E27FC236}">
-                <a16:creationId xmlns:a16="http://schemas.microsoft.com/office/drawing/2014/main" id="{B96EE5D1-D319-3747-9D63-033D0C44B66F}"/>
-              </a:ext>
-            </a:extLst>
-          </p:cNvPr>
+          <p:cNvPr id="5" name="Date Placeholder 4"/>
           <p:cNvSpPr>
             <a:spLocks noGrp="1"/>
           </p:cNvSpPr>
@@ -2375,7 +2098,7 @@
           <a:p>
             <a:fld id="{56238ED0-F578-2D4C-AD64-804B2004F0AF}" type="datetimeFigureOut">
               <a:rPr lang="en-US" smtClean="0"/>
-              <a:t>4/19/19</a:t>
+              <a:t>4/21/19</a:t>
             </a:fld>
             <a:endParaRPr lang="en-US"/>
           </a:p>
@@ -2383,13 +2106,7 @@
       </p:sp>
       <p:sp>
         <p:nvSpPr>
-          <p:cNvPr id="6" name="Footer Placeholder 5">
-            <a:extLst>
-              <a:ext uri="{FF2B5EF4-FFF2-40B4-BE49-F238E27FC236}">
-                <a16:creationId xmlns:a16="http://schemas.microsoft.com/office/drawing/2014/main" id="{A1CEED28-EC5E-D745-9F45-E7C52EF261ED}"/>
-              </a:ext>
-            </a:extLst>
-          </p:cNvPr>
+          <p:cNvPr id="6" name="Footer Placeholder 5"/>
           <p:cNvSpPr>
             <a:spLocks noGrp="1"/>
           </p:cNvSpPr>
@@ -2408,13 +2125,7 @@
       </p:sp>
       <p:sp>
         <p:nvSpPr>
-          <p:cNvPr id="7" name="Slide Number Placeholder 6">
-            <a:extLst>
-              <a:ext uri="{FF2B5EF4-FFF2-40B4-BE49-F238E27FC236}">
-                <a16:creationId xmlns:a16="http://schemas.microsoft.com/office/drawing/2014/main" id="{760B600E-D10D-C940-B707-D7101F53248A}"/>
-              </a:ext>
-            </a:extLst>
-          </p:cNvPr>
+          <p:cNvPr id="7" name="Slide Number Placeholder 6"/>
           <p:cNvSpPr>
             <a:spLocks noGrp="1"/>
           </p:cNvSpPr>
@@ -2438,7 +2149,7 @@
     </p:spTree>
     <p:extLst>
       <p:ext uri="{BB962C8B-B14F-4D97-AF65-F5344CB8AC3E}">
-        <p14:creationId xmlns:p14="http://schemas.microsoft.com/office/powerpoint/2010/main" val="3977195985"/>
+        <p14:creationId xmlns:p14="http://schemas.microsoft.com/office/powerpoint/2010/main" val="1518281687"/>
       </p:ext>
     </p:extLst>
   </p:cSld>
@@ -2467,13 +2178,7 @@
       </p:grpSpPr>
       <p:sp>
         <p:nvSpPr>
-          <p:cNvPr id="2" name="Title 1">
-            <a:extLst>
-              <a:ext uri="{FF2B5EF4-FFF2-40B4-BE49-F238E27FC236}">
-                <a16:creationId xmlns:a16="http://schemas.microsoft.com/office/drawing/2014/main" id="{B9BCF886-C504-5041-ACA1-0073B5DF2B53}"/>
-              </a:ext>
-            </a:extLst>
-          </p:cNvPr>
+          <p:cNvPr id="2" name="Title 1"/>
           <p:cNvSpPr>
             <a:spLocks noGrp="1"/>
           </p:cNvSpPr>
@@ -2499,20 +2204,15 @@
               <a:rPr lang="en-US"/>
               <a:t>Click to edit Master title style</a:t>
             </a:r>
-          </a:p>
-        </p:txBody>
-      </p:sp>
-      <p:sp>
-        <p:nvSpPr>
-          <p:cNvPr id="3" name="Picture Placeholder 2">
-            <a:extLst>
-              <a:ext uri="{FF2B5EF4-FFF2-40B4-BE49-F238E27FC236}">
-                <a16:creationId xmlns:a16="http://schemas.microsoft.com/office/drawing/2014/main" id="{4EF617AD-773A-5B40-BB21-ACBD56BDC128}"/>
-              </a:ext>
-            </a:extLst>
-          </p:cNvPr>
-          <p:cNvSpPr>
-            <a:spLocks noGrp="1"/>
+            <a:endParaRPr lang="en-US" dirty="0"/>
+          </a:p>
+        </p:txBody>
+      </p:sp>
+      <p:sp>
+        <p:nvSpPr>
+          <p:cNvPr id="3" name="Picture Placeholder 2"/>
+          <p:cNvSpPr>
+            <a:spLocks noGrp="1" noChangeAspect="1"/>
           </p:cNvSpPr>
           <p:nvPr>
             <p:ph type="pic" idx="1"/>
@@ -2525,7 +2225,7 @@
           </a:xfrm>
         </p:spPr>
         <p:txBody>
-          <a:bodyPr/>
+          <a:bodyPr anchor="t"/>
           <a:lstStyle>
             <a:lvl1pPr marL="0" indent="0">
               <a:buNone/>
@@ -2565,19 +2265,17 @@
             </a:lvl9pPr>
           </a:lstStyle>
           <a:p>
-            <a:endParaRPr lang="en-US"/>
-          </a:p>
-        </p:txBody>
-      </p:sp>
-      <p:sp>
-        <p:nvSpPr>
-          <p:cNvPr id="4" name="Text Placeholder 3">
-            <a:extLst>
-              <a:ext uri="{FF2B5EF4-FFF2-40B4-BE49-F238E27FC236}">
-                <a16:creationId xmlns:a16="http://schemas.microsoft.com/office/drawing/2014/main" id="{B0B8DAA7-2131-134A-9D39-880E1877A29D}"/>
-              </a:ext>
-            </a:extLst>
-          </p:cNvPr>
+            <a:r>
+              <a:rPr lang="en-US"/>
+              <a:t>Click icon to add picture</a:t>
+            </a:r>
+            <a:endParaRPr lang="en-US" dirty="0"/>
+          </a:p>
+        </p:txBody>
+      </p:sp>
+      <p:sp>
+        <p:nvSpPr>
+          <p:cNvPr id="4" name="Text Placeholder 3"/>
           <p:cNvSpPr>
             <a:spLocks noGrp="1"/>
           </p:cNvSpPr>
@@ -2642,13 +2340,7 @@
       </p:sp>
       <p:sp>
         <p:nvSpPr>
-          <p:cNvPr id="5" name="Date Placeholder 4">
-            <a:extLst>
-              <a:ext uri="{FF2B5EF4-FFF2-40B4-BE49-F238E27FC236}">
-                <a16:creationId xmlns:a16="http://schemas.microsoft.com/office/drawing/2014/main" id="{D3D5D885-6029-A044-98D6-1CAA11E21422}"/>
-              </a:ext>
-            </a:extLst>
-          </p:cNvPr>
+          <p:cNvPr id="5" name="Date Placeholder 4"/>
           <p:cNvSpPr>
             <a:spLocks noGrp="1"/>
           </p:cNvSpPr>
@@ -2663,7 +2355,7 @@
           <a:p>
             <a:fld id="{56238ED0-F578-2D4C-AD64-804B2004F0AF}" type="datetimeFigureOut">
               <a:rPr lang="en-US" smtClean="0"/>
-              <a:t>4/19/19</a:t>
+              <a:t>4/21/19</a:t>
             </a:fld>
             <a:endParaRPr lang="en-US"/>
           </a:p>
@@ -2671,13 +2363,7 @@
       </p:sp>
       <p:sp>
         <p:nvSpPr>
-          <p:cNvPr id="6" name="Footer Placeholder 5">
-            <a:extLst>
-              <a:ext uri="{FF2B5EF4-FFF2-40B4-BE49-F238E27FC236}">
-                <a16:creationId xmlns:a16="http://schemas.microsoft.com/office/drawing/2014/main" id="{BEC5DF9C-5FA4-DD4A-9F66-3FBDC64A6CF0}"/>
-              </a:ext>
-            </a:extLst>
-          </p:cNvPr>
+          <p:cNvPr id="6" name="Footer Placeholder 5"/>
           <p:cNvSpPr>
             <a:spLocks noGrp="1"/>
           </p:cNvSpPr>
@@ -2696,13 +2382,7 @@
       </p:sp>
       <p:sp>
         <p:nvSpPr>
-          <p:cNvPr id="7" name="Slide Number Placeholder 6">
-            <a:extLst>
-              <a:ext uri="{FF2B5EF4-FFF2-40B4-BE49-F238E27FC236}">
-                <a16:creationId xmlns:a16="http://schemas.microsoft.com/office/drawing/2014/main" id="{6E009FA1-DE14-F441-BB11-CEBEDD5FE7F1}"/>
-              </a:ext>
-            </a:extLst>
-          </p:cNvPr>
+          <p:cNvPr id="7" name="Slide Number Placeholder 6"/>
           <p:cNvSpPr>
             <a:spLocks noGrp="1"/>
           </p:cNvSpPr>
@@ -2726,7 +2406,7 @@
     </p:spTree>
     <p:extLst>
       <p:ext uri="{BB962C8B-B14F-4D97-AF65-F5344CB8AC3E}">
-        <p14:creationId xmlns:p14="http://schemas.microsoft.com/office/powerpoint/2010/main" val="372205427"/>
+        <p14:creationId xmlns:p14="http://schemas.microsoft.com/office/powerpoint/2010/main" val="1601077077"/>
       </p:ext>
     </p:extLst>
   </p:cSld>
@@ -2760,13 +2440,7 @@
       </p:grpSpPr>
       <p:sp>
         <p:nvSpPr>
-          <p:cNvPr id="2" name="Title Placeholder 1">
-            <a:extLst>
-              <a:ext uri="{FF2B5EF4-FFF2-40B4-BE49-F238E27FC236}">
-                <a16:creationId xmlns:a16="http://schemas.microsoft.com/office/drawing/2014/main" id="{255EDF34-B6CE-2541-A0DD-30EC1E076D17}"/>
-              </a:ext>
-            </a:extLst>
-          </p:cNvPr>
+          <p:cNvPr id="2" name="Title Placeholder 1"/>
           <p:cNvSpPr>
             <a:spLocks noGrp="1"/>
           </p:cNvSpPr>
@@ -2793,18 +2467,13 @@
               <a:rPr lang="en-US"/>
               <a:t>Click to edit Master title style</a:t>
             </a:r>
-          </a:p>
-        </p:txBody>
-      </p:sp>
-      <p:sp>
-        <p:nvSpPr>
-          <p:cNvPr id="3" name="Text Placeholder 2">
-            <a:extLst>
-              <a:ext uri="{FF2B5EF4-FFF2-40B4-BE49-F238E27FC236}">
-                <a16:creationId xmlns:a16="http://schemas.microsoft.com/office/drawing/2014/main" id="{3E8A42C2-FADF-AB48-BE53-CEF16FAB38B0}"/>
-              </a:ext>
-            </a:extLst>
-          </p:cNvPr>
+            <a:endParaRPr lang="en-US" dirty="0"/>
+          </a:p>
+        </p:txBody>
+      </p:sp>
+      <p:sp>
+        <p:nvSpPr>
+          <p:cNvPr id="3" name="Text Placeholder 2"/>
           <p:cNvSpPr>
             <a:spLocks noGrp="1"/>
           </p:cNvSpPr>
@@ -2860,18 +2529,13 @@
               <a:rPr lang="en-US"/>
               <a:t>Fifth level</a:t>
             </a:r>
-          </a:p>
-        </p:txBody>
-      </p:sp>
-      <p:sp>
-        <p:nvSpPr>
-          <p:cNvPr id="4" name="Date Placeholder 3">
-            <a:extLst>
-              <a:ext uri="{FF2B5EF4-FFF2-40B4-BE49-F238E27FC236}">
-                <a16:creationId xmlns:a16="http://schemas.microsoft.com/office/drawing/2014/main" id="{4D50AA06-0FF3-1045-83B2-6902430D3081}"/>
-              </a:ext>
-            </a:extLst>
-          </p:cNvPr>
+            <a:endParaRPr lang="en-US" dirty="0"/>
+          </a:p>
+        </p:txBody>
+      </p:sp>
+      <p:sp>
+        <p:nvSpPr>
+          <p:cNvPr id="4" name="Date Placeholder 3"/>
           <p:cNvSpPr>
             <a:spLocks noGrp="1"/>
           </p:cNvSpPr>
@@ -2904,7 +2568,7 @@
           <a:p>
             <a:fld id="{56238ED0-F578-2D4C-AD64-804B2004F0AF}" type="datetimeFigureOut">
               <a:rPr lang="en-US" smtClean="0"/>
-              <a:t>4/19/19</a:t>
+              <a:t>4/21/19</a:t>
             </a:fld>
             <a:endParaRPr lang="en-US"/>
           </a:p>
@@ -2912,13 +2576,7 @@
       </p:sp>
       <p:sp>
         <p:nvSpPr>
-          <p:cNvPr id="5" name="Footer Placeholder 4">
-            <a:extLst>
-              <a:ext uri="{FF2B5EF4-FFF2-40B4-BE49-F238E27FC236}">
-                <a16:creationId xmlns:a16="http://schemas.microsoft.com/office/drawing/2014/main" id="{D015CEE0-AB34-B242-8D8E-0A14C3B7D90D}"/>
-              </a:ext>
-            </a:extLst>
-          </p:cNvPr>
+          <p:cNvPr id="5" name="Footer Placeholder 4"/>
           <p:cNvSpPr>
             <a:spLocks noGrp="1"/>
           </p:cNvSpPr>
@@ -2955,13 +2613,7 @@
       </p:sp>
       <p:sp>
         <p:nvSpPr>
-          <p:cNvPr id="6" name="Slide Number Placeholder 5">
-            <a:extLst>
-              <a:ext uri="{FF2B5EF4-FFF2-40B4-BE49-F238E27FC236}">
-                <a16:creationId xmlns:a16="http://schemas.microsoft.com/office/drawing/2014/main" id="{AC3F7828-15DE-3545-B9DA-6155E8840047}"/>
-              </a:ext>
-            </a:extLst>
-          </p:cNvPr>
+          <p:cNvPr id="6" name="Slide Number Placeholder 5"/>
           <p:cNvSpPr>
             <a:spLocks noGrp="1"/>
           </p:cNvSpPr>
@@ -3003,23 +2655,23 @@
     </p:spTree>
     <p:extLst>
       <p:ext uri="{BB962C8B-B14F-4D97-AF65-F5344CB8AC3E}">
-        <p14:creationId xmlns:p14="http://schemas.microsoft.com/office/powerpoint/2010/main" val="3798192572"/>
+        <p14:creationId xmlns:p14="http://schemas.microsoft.com/office/powerpoint/2010/main" val="411531133"/>
       </p:ext>
     </p:extLst>
   </p:cSld>
   <p:clrMap bg1="lt1" tx1="dk1" bg2="lt2" tx2="dk2" accent1="accent1" accent2="accent2" accent3="accent3" accent4="accent4" accent5="accent5" accent6="accent6" hlink="hlink" folHlink="folHlink"/>
   <p:sldLayoutIdLst>
-    <p:sldLayoutId id="2147483649" r:id="rId1"/>
-    <p:sldLayoutId id="2147483650" r:id="rId2"/>
-    <p:sldLayoutId id="2147483651" r:id="rId3"/>
-    <p:sldLayoutId id="2147483652" r:id="rId4"/>
-    <p:sldLayoutId id="2147483653" r:id="rId5"/>
-    <p:sldLayoutId id="2147483654" r:id="rId6"/>
-    <p:sldLayoutId id="2147483655" r:id="rId7"/>
-    <p:sldLayoutId id="2147483656" r:id="rId8"/>
-    <p:sldLayoutId id="2147483657" r:id="rId9"/>
-    <p:sldLayoutId id="2147483658" r:id="rId10"/>
-    <p:sldLayoutId id="2147483659" r:id="rId11"/>
+    <p:sldLayoutId id="2147483673" r:id="rId1"/>
+    <p:sldLayoutId id="2147483674" r:id="rId2"/>
+    <p:sldLayoutId id="2147483675" r:id="rId3"/>
+    <p:sldLayoutId id="2147483676" r:id="rId4"/>
+    <p:sldLayoutId id="2147483677" r:id="rId5"/>
+    <p:sldLayoutId id="2147483678" r:id="rId6"/>
+    <p:sldLayoutId id="2147483679" r:id="rId7"/>
+    <p:sldLayoutId id="2147483680" r:id="rId8"/>
+    <p:sldLayoutId id="2147483681" r:id="rId9"/>
+    <p:sldLayoutId id="2147483682" r:id="rId10"/>
+    <p:sldLayoutId id="2147483683" r:id="rId11"/>
   </p:sldLayoutIdLst>
   <p:txStyles>
     <p:titleStyle>
@@ -3387,7 +3039,7 @@
 <file path=ppt/theme/theme1.xml><?xml version="1.0" encoding="utf-8"?>
 <a:theme xmlns:a="http://schemas.openxmlformats.org/drawingml/2006/main" name="Office Theme">
   <a:themeElements>
-    <a:clrScheme name="Office">
+    <a:clrScheme name="Office Theme">
       <a:dk1>
         <a:sysClr val="windowText" lastClr="000000"/>
       </a:dk1>
@@ -3425,7 +3077,7 @@
         <a:srgbClr val="954F72"/>
       </a:folHlink>
     </a:clrScheme>
-    <a:fontScheme name="Office">
+    <a:fontScheme name="Office Theme">
       <a:majorFont>
         <a:latin typeface="Calibri Light" panose="020F0302020204030204"/>
         <a:ea typeface=""/>
@@ -3460,23 +3112,6 @@
         <a:font script="Viet" typeface="Times New Roman"/>
         <a:font script="Uigh" typeface="Microsoft Uighur"/>
         <a:font script="Geor" typeface="Sylfaen"/>
-        <a:font script="Armn" typeface="Arial"/>
-        <a:font script="Bugi" typeface="Leelawadee UI"/>
-        <a:font script="Bopo" typeface="Microsoft JhengHei"/>
-        <a:font script="Java" typeface="Javanese Text"/>
-        <a:font script="Lisu" typeface="Segoe UI"/>
-        <a:font script="Mymr" typeface="Myanmar Text"/>
-        <a:font script="Nkoo" typeface="Ebrima"/>
-        <a:font script="Olck" typeface="Nirmala UI"/>
-        <a:font script="Osma" typeface="Ebrima"/>
-        <a:font script="Phag" typeface="Phagspa"/>
-        <a:font script="Syrn" typeface="Estrangelo Edessa"/>
-        <a:font script="Syrj" typeface="Estrangelo Edessa"/>
-        <a:font script="Syre" typeface="Estrangelo Edessa"/>
-        <a:font script="Sora" typeface="Nirmala UI"/>
-        <a:font script="Tale" typeface="Microsoft Tai Le"/>
-        <a:font script="Talu" typeface="Microsoft New Tai Lue"/>
-        <a:font script="Tfng" typeface="Ebrima"/>
       </a:majorFont>
       <a:minorFont>
         <a:latin typeface="Calibri" panose="020F0502020204030204"/>
@@ -3512,26 +3147,9 @@
         <a:font script="Viet" typeface="Arial"/>
         <a:font script="Uigh" typeface="Microsoft Uighur"/>
         <a:font script="Geor" typeface="Sylfaen"/>
-        <a:font script="Armn" typeface="Arial"/>
-        <a:font script="Bugi" typeface="Leelawadee UI"/>
-        <a:font script="Bopo" typeface="Microsoft JhengHei"/>
-        <a:font script="Java" typeface="Javanese Text"/>
-        <a:font script="Lisu" typeface="Segoe UI"/>
-        <a:font script="Mymr" typeface="Myanmar Text"/>
-        <a:font script="Nkoo" typeface="Ebrima"/>
-        <a:font script="Olck" typeface="Nirmala UI"/>
-        <a:font script="Osma" typeface="Ebrima"/>
-        <a:font script="Phag" typeface="Phagspa"/>
-        <a:font script="Syrn" typeface="Estrangelo Edessa"/>
-        <a:font script="Syrj" typeface="Estrangelo Edessa"/>
-        <a:font script="Syre" typeface="Estrangelo Edessa"/>
-        <a:font script="Sora" typeface="Nirmala UI"/>
-        <a:font script="Tale" typeface="Microsoft Tai Le"/>
-        <a:font script="Talu" typeface="Microsoft New Tai Lue"/>
-        <a:font script="Tfng" typeface="Ebrima"/>
       </a:minorFont>
     </a:fontScheme>
-    <a:fmtScheme name="Office">
+    <a:fmtScheme name="Office Theme">
       <a:fillStyleLst>
         <a:solidFill>
           <a:schemeClr val="phClr"/>

</xml_diff>